<commit_message>
Aggiunta sviluppi futuri nella presentazione
</commit_message>
<xml_diff>
--- a/I3_Presentazione_Carthafind.pptx
+++ b/I3_Presentazione_Carthafind.pptx
@@ -5,7 +5,7 @@
     <p:sldMasterId id="2147483659" r:id="rId1"/>
   </p:sldMasterIdLst>
   <p:notesMasterIdLst>
-    <p:notesMasterId r:id="rId23"/>
+    <p:notesMasterId r:id="rId24"/>
   </p:notesMasterIdLst>
   <p:sldIdLst>
     <p:sldId id="256" r:id="rId2"/>
@@ -27,24 +27,25 @@
     <p:sldId id="277" r:id="rId18"/>
     <p:sldId id="278" r:id="rId19"/>
     <p:sldId id="279" r:id="rId20"/>
-    <p:sldId id="257" r:id="rId21"/>
-    <p:sldId id="280" r:id="rId22"/>
+    <p:sldId id="294" r:id="rId21"/>
+    <p:sldId id="257" r:id="rId22"/>
+    <p:sldId id="280" r:id="rId23"/>
   </p:sldIdLst>
   <p:sldSz cx="9144000" cy="5143500" type="screen16x9"/>
   <p:notesSz cx="6858000" cy="9144000"/>
   <p:embeddedFontLst>
     <p:embeddedFont>
+      <p:font typeface="Roboto Slab" panose="020B0604020202020204" charset="0"/>
+      <p:regular r:id="rId25"/>
+      <p:bold r:id="rId26"/>
+    </p:embeddedFont>
+    <p:embeddedFont>
       <p:font typeface="Nixie One" panose="020B0604020202020204" charset="0"/>
-      <p:regular r:id="rId24"/>
+      <p:regular r:id="rId27"/>
     </p:embeddedFont>
     <p:embeddedFont>
       <p:font typeface="Impact" panose="020B0806030902050204" pitchFamily="34" charset="0"/>
-      <p:regular r:id="rId25"/>
-    </p:embeddedFont>
-    <p:embeddedFont>
-      <p:font typeface="Roboto Slab" panose="020B0604020202020204" charset="0"/>
-      <p:regular r:id="rId26"/>
-      <p:bold r:id="rId27"/>
+      <p:regular r:id="rId28"/>
     </p:embeddedFont>
   </p:embeddedFontLst>
   <p:defaultTextStyle>
@@ -2041,6 +2042,115 @@
   <p:cSld>
     <p:spTree>
       <p:nvGrpSpPr>
+        <p:cNvPr id="1" name="Shape 141"/>
+        <p:cNvGrpSpPr/>
+        <p:nvPr/>
+      </p:nvGrpSpPr>
+      <p:grpSpPr>
+        <a:xfrm>
+          <a:off x="0" y="0"/>
+          <a:ext cx="0" cy="0"/>
+          <a:chOff x="0" y="0"/>
+          <a:chExt cx="0" cy="0"/>
+        </a:xfrm>
+      </p:grpSpPr>
+      <p:sp>
+        <p:nvSpPr>
+          <p:cNvPr id="142" name="Shape 142"/>
+          <p:cNvSpPr>
+            <a:spLocks noGrp="1" noRot="1" noChangeAspect="1"/>
+          </p:cNvSpPr>
+          <p:nvPr>
+            <p:ph type="sldImg" idx="2"/>
+          </p:nvPr>
+        </p:nvSpPr>
+        <p:spPr>
+          <a:xfrm>
+            <a:off x="381000" y="685800"/>
+            <a:ext cx="6096000" cy="3429000"/>
+          </a:xfrm>
+          <a:custGeom>
+            <a:avLst/>
+            <a:gdLst/>
+            <a:ahLst/>
+            <a:cxnLst/>
+            <a:rect l="0" t="0" r="0" b="0"/>
+            <a:pathLst>
+              <a:path w="120000" h="120000" extrusionOk="0">
+                <a:moveTo>
+                  <a:pt x="0" y="0"/>
+                </a:moveTo>
+                <a:lnTo>
+                  <a:pt x="120000" y="0"/>
+                </a:lnTo>
+                <a:lnTo>
+                  <a:pt x="120000" y="120000"/>
+                </a:lnTo>
+                <a:lnTo>
+                  <a:pt x="0" y="120000"/>
+                </a:lnTo>
+                <a:close/>
+              </a:path>
+            </a:pathLst>
+          </a:custGeom>
+        </p:spPr>
+      </p:sp>
+      <p:sp>
+        <p:nvSpPr>
+          <p:cNvPr id="143" name="Shape 143"/>
+          <p:cNvSpPr txBox="1">
+            <a:spLocks noGrp="1"/>
+          </p:cNvSpPr>
+          <p:nvPr>
+            <p:ph type="body" idx="1"/>
+          </p:nvPr>
+        </p:nvSpPr>
+        <p:spPr>
+          <a:xfrm>
+            <a:off x="685800" y="4343400"/>
+            <a:ext cx="5486400" cy="4114800"/>
+          </a:xfrm>
+          <a:prstGeom prst="rect">
+            <a:avLst/>
+          </a:prstGeom>
+        </p:spPr>
+        <p:txBody>
+          <a:bodyPr spcFirstLastPara="1" wrap="square" lIns="91425" tIns="91425" rIns="91425" bIns="91425" anchor="t" anchorCtr="0">
+            <a:noAutofit/>
+          </a:bodyPr>
+          <a:lstStyle/>
+          <a:p>
+            <a:pPr marL="0" lvl="0" indent="0">
+              <a:spcBef>
+                <a:spcPts val="0"/>
+              </a:spcBef>
+              <a:spcAft>
+                <a:spcPts val="0"/>
+              </a:spcAft>
+              <a:buNone/>
+            </a:pPr>
+            <a:endParaRPr/>
+          </a:p>
+        </p:txBody>
+      </p:sp>
+    </p:spTree>
+    <p:extLst>
+      <p:ext uri="{BB962C8B-B14F-4D97-AF65-F5344CB8AC3E}">
+        <p14:creationId xmlns:p14="http://schemas.microsoft.com/office/powerpoint/2010/main" val="277141893"/>
+      </p:ext>
+    </p:extLst>
+  </p:cSld>
+  <p:clrMapOvr>
+    <a:masterClrMapping/>
+  </p:clrMapOvr>
+</p:notes>
+</file>
+
+<file path=ppt/notesSlides/notesSlide21.xml><?xml version="1.0" encoding="utf-8"?>
+<p:notes xmlns:a="http://schemas.openxmlformats.org/drawingml/2006/main" xmlns:r="http://schemas.openxmlformats.org/officeDocument/2006/relationships" xmlns:p="http://schemas.openxmlformats.org/presentationml/2006/main" showMasterSp="0" showMasterPhAnim="0">
+  <p:cSld>
+    <p:spTree>
+      <p:nvGrpSpPr>
         <p:cNvPr id="1" name="Shape 107"/>
         <p:cNvGrpSpPr/>
         <p:nvPr/>
@@ -2145,7 +2255,7 @@
 </p:notes>
 </file>
 
-<file path=ppt/notesSlides/notesSlide21.xml><?xml version="1.0" encoding="utf-8"?>
+<file path=ppt/notesSlides/notesSlide22.xml><?xml version="1.0" encoding="utf-8"?>
 <p:notes xmlns:a="http://schemas.openxmlformats.org/drawingml/2006/main" xmlns:r="http://schemas.openxmlformats.org/officeDocument/2006/relationships" xmlns:p="http://schemas.openxmlformats.org/presentationml/2006/main" showMasterSp="0" showMasterPhAnim="0">
   <p:cSld>
     <p:spTree>
@@ -19330,15 +19440,6 @@
               </a:rPr>
               <a:t>Carthafind</a:t>
             </a:r>
-            <a:endParaRPr lang="it-CH" sz="1600" b="1" dirty="0">
-              <a:solidFill>
-                <a:srgbClr val="18637B"/>
-              </a:solidFill>
-              <a:latin typeface="Roboto Slab"/>
-              <a:ea typeface="Roboto Slab"/>
-              <a:cs typeface="Roboto Slab"/>
-              <a:sym typeface="Nixie One"/>
-            </a:endParaRPr>
           </a:p>
         </p:txBody>
       </p:sp>
@@ -20214,15 +20315,6 @@
               </a:rPr>
               <a:t>Carthafind</a:t>
             </a:r>
-            <a:endParaRPr lang="it-CH" sz="1600" b="1" dirty="0">
-              <a:solidFill>
-                <a:srgbClr val="18637B"/>
-              </a:solidFill>
-              <a:latin typeface="Roboto Slab"/>
-              <a:ea typeface="Roboto Slab"/>
-              <a:cs typeface="Roboto Slab"/>
-              <a:sym typeface="Nixie One"/>
-            </a:endParaRPr>
           </a:p>
         </p:txBody>
       </p:sp>
@@ -20873,15 +20965,6 @@
               </a:rPr>
               <a:t>Carthafind</a:t>
             </a:r>
-            <a:endParaRPr lang="it-CH" sz="1600" b="1" dirty="0">
-              <a:solidFill>
-                <a:srgbClr val="18637B"/>
-              </a:solidFill>
-              <a:latin typeface="Roboto Slab"/>
-              <a:ea typeface="Roboto Slab"/>
-              <a:cs typeface="Roboto Slab"/>
-              <a:sym typeface="Nixie One"/>
-            </a:endParaRPr>
           </a:p>
         </p:txBody>
       </p:sp>
@@ -21033,6 +21116,199 @@
 </file>
 
 <file path=ppt/slides/slide20.xml><?xml version="1.0" encoding="utf-8"?>
+<p:sld xmlns:a="http://schemas.openxmlformats.org/drawingml/2006/main" xmlns:r="http://schemas.openxmlformats.org/officeDocument/2006/relationships" xmlns:p="http://schemas.openxmlformats.org/presentationml/2006/main">
+  <p:cSld>
+    <p:spTree>
+      <p:nvGrpSpPr>
+        <p:cNvPr id="1" name="Shape 144"/>
+        <p:cNvGrpSpPr/>
+        <p:nvPr/>
+      </p:nvGrpSpPr>
+      <p:grpSpPr>
+        <a:xfrm>
+          <a:off x="0" y="0"/>
+          <a:ext cx="0" cy="0"/>
+          <a:chOff x="0" y="0"/>
+          <a:chExt cx="0" cy="0"/>
+        </a:xfrm>
+      </p:grpSpPr>
+      <p:sp>
+        <p:nvSpPr>
+          <p:cNvPr id="145" name="Shape 145"/>
+          <p:cNvSpPr txBox="1">
+            <a:spLocks noGrp="1"/>
+          </p:cNvSpPr>
+          <p:nvPr>
+            <p:ph type="title"/>
+          </p:nvPr>
+        </p:nvSpPr>
+        <p:spPr>
+          <a:xfrm>
+            <a:off x="1146025" y="530725"/>
+            <a:ext cx="3208800" cy="1028700"/>
+          </a:xfrm>
+          <a:prstGeom prst="rect">
+            <a:avLst/>
+          </a:prstGeom>
+        </p:spPr>
+        <p:txBody>
+          <a:bodyPr spcFirstLastPara="1" wrap="square" lIns="91425" tIns="91425" rIns="91425" bIns="91425" anchor="ctr" anchorCtr="0">
+            <a:noAutofit/>
+          </a:bodyPr>
+          <a:lstStyle/>
+          <a:p>
+            <a:pPr marL="0" lvl="0" indent="0">
+              <a:spcBef>
+                <a:spcPts val="0"/>
+              </a:spcBef>
+              <a:spcAft>
+                <a:spcPts val="0"/>
+              </a:spcAft>
+              <a:buNone/>
+            </a:pPr>
+            <a:r>
+              <a:rPr lang="it-CH" sz="2800" dirty="0" smtClean="0"/>
+              <a:t>Sviluppi futuri</a:t>
+            </a:r>
+            <a:endParaRPr lang="it-CH" sz="2800" dirty="0"/>
+          </a:p>
+        </p:txBody>
+      </p:sp>
+      <p:sp>
+        <p:nvSpPr>
+          <p:cNvPr id="146" name="Shape 146"/>
+          <p:cNvSpPr txBox="1">
+            <a:spLocks noGrp="1"/>
+          </p:cNvSpPr>
+          <p:nvPr>
+            <p:ph type="body" idx="1"/>
+          </p:nvPr>
+        </p:nvSpPr>
+        <p:spPr>
+          <a:xfrm>
+            <a:off x="1146025" y="1897118"/>
+            <a:ext cx="7540800" cy="3158700"/>
+          </a:xfrm>
+          <a:prstGeom prst="rect">
+            <a:avLst/>
+          </a:prstGeom>
+        </p:spPr>
+        <p:txBody>
+          <a:bodyPr spcFirstLastPara="1" wrap="square" lIns="91425" tIns="91425" rIns="91425" bIns="91425" anchor="t" anchorCtr="0">
+            <a:noAutofit/>
+          </a:bodyPr>
+          <a:lstStyle/>
+          <a:p>
+            <a:pPr marL="457200" lvl="0" indent="-406400" rtl="0">
+              <a:spcBef>
+                <a:spcPts val="600"/>
+              </a:spcBef>
+              <a:spcAft>
+                <a:spcPts val="0"/>
+              </a:spcAft>
+              <a:buSzPts val="2800"/>
+              <a:buChar char="▪"/>
+            </a:pPr>
+            <a:r>
+              <a:rPr lang="en-GB" dirty="0" smtClean="0"/>
+              <a:t>Modifica ed eliminazione</a:t>
+            </a:r>
+          </a:p>
+          <a:p>
+            <a:pPr marL="50800" lvl="0" indent="0" rtl="0">
+              <a:spcBef>
+                <a:spcPts val="600"/>
+              </a:spcBef>
+              <a:spcAft>
+                <a:spcPts val="0"/>
+              </a:spcAft>
+              <a:buSzPts val="2800"/>
+              <a:buNone/>
+            </a:pPr>
+            <a:endParaRPr lang="en-GB" dirty="0"/>
+          </a:p>
+          <a:p>
+            <a:pPr marL="457200" lvl="0" indent="-406400" rtl="0">
+              <a:spcBef>
+                <a:spcPts val="600"/>
+              </a:spcBef>
+              <a:spcAft>
+                <a:spcPts val="0"/>
+              </a:spcAft>
+              <a:buSzPts val="2800"/>
+              <a:buChar char="▪"/>
+            </a:pPr>
+            <a:r>
+              <a:rPr lang="en-GB" dirty="0" smtClean="0"/>
+              <a:t>Algoritmi di controllo</a:t>
+            </a:r>
+          </a:p>
+          <a:p>
+            <a:pPr marL="457200" lvl="0" indent="-406400" rtl="0">
+              <a:spcBef>
+                <a:spcPts val="600"/>
+              </a:spcBef>
+              <a:spcAft>
+                <a:spcPts val="0"/>
+              </a:spcAft>
+              <a:buSzPts val="2800"/>
+              <a:buChar char="▪"/>
+            </a:pPr>
+            <a:endParaRPr lang="en-GB" dirty="0"/>
+          </a:p>
+          <a:p>
+            <a:pPr marL="457200" lvl="0" indent="-406400" rtl="0">
+              <a:spcBef>
+                <a:spcPts val="600"/>
+              </a:spcBef>
+              <a:spcAft>
+                <a:spcPts val="0"/>
+              </a:spcAft>
+              <a:buSzPts val="2800"/>
+              <a:buChar char="▪"/>
+            </a:pPr>
+            <a:r>
+              <a:rPr lang="en-GB" dirty="0" smtClean="0"/>
+              <a:t>Ricerca per contenuto doc</a:t>
+            </a:r>
+            <a:endParaRPr lang="it-CH" dirty="0" smtClean="0"/>
+          </a:p>
+          <a:p>
+            <a:pPr marL="457200" lvl="0" indent="-406400" rtl="0">
+              <a:spcBef>
+                <a:spcPts val="600"/>
+              </a:spcBef>
+              <a:spcAft>
+                <a:spcPts val="0"/>
+              </a:spcAft>
+              <a:buSzPts val="2800"/>
+              <a:buChar char="▪"/>
+            </a:pPr>
+            <a:endParaRPr lang="it-CH" dirty="0"/>
+          </a:p>
+        </p:txBody>
+      </p:sp>
+    </p:spTree>
+    <p:extLst>
+      <p:ext uri="{BB962C8B-B14F-4D97-AF65-F5344CB8AC3E}">
+        <p14:creationId xmlns:p14="http://schemas.microsoft.com/office/powerpoint/2010/main" val="2343035252"/>
+      </p:ext>
+    </p:extLst>
+  </p:cSld>
+  <p:clrMapOvr>
+    <a:masterClrMapping/>
+  </p:clrMapOvr>
+  <p:timing>
+    <p:tnLst>
+      <p:par>
+        <p:cTn id="1" dur="indefinite" restart="never" nodeType="tmRoot"/>
+      </p:par>
+    </p:tnLst>
+  </p:timing>
+</p:sld>
+</file>
+
+<file path=ppt/slides/slide21.xml><?xml version="1.0" encoding="utf-8"?>
 <p:sld xmlns:a="http://schemas.openxmlformats.org/drawingml/2006/main" xmlns:r="http://schemas.openxmlformats.org/officeDocument/2006/relationships" xmlns:p="http://schemas.openxmlformats.org/presentationml/2006/main">
   <p:cSld>
     <p:spTree>
@@ -21824,7 +22100,7 @@
 </p:sld>
 </file>
 
-<file path=ppt/slides/slide21.xml><?xml version="1.0" encoding="utf-8"?>
+<file path=ppt/slides/slide22.xml><?xml version="1.0" encoding="utf-8"?>
 <p:sld xmlns:a="http://schemas.openxmlformats.org/drawingml/2006/main" xmlns:r="http://schemas.openxmlformats.org/officeDocument/2006/relationships" xmlns:p="http://schemas.openxmlformats.org/presentationml/2006/main">
   <p:cSld>
     <p:spTree>
@@ -21914,15 +22190,7 @@
                   <a:srgbClr val="FFFFFF"/>
                 </a:solidFill>
               </a:rPr>
-              <a:t>Domande</a:t>
-            </a:r>
-            <a:r>
-              <a:rPr lang="en" sz="3600" b="1" dirty="0" smtClean="0">
-                <a:solidFill>
-                  <a:srgbClr val="FFFFFF"/>
-                </a:solidFill>
-              </a:rPr>
-              <a:t>?</a:t>
+              <a:t>Domande?</a:t>
             </a:r>
           </a:p>
           <a:p>
@@ -27131,8 +27399,24 @@
             </a:pPr>
             <a:r>
               <a:rPr lang="en-GB" dirty="0" smtClean="0"/>
-              <a:t>Ricerca per campi e parole chiave</a:t>
+              <a:t>Ricerca per campi e parole </a:t>
             </a:r>
+            <a:r>
+              <a:rPr lang="en-GB" dirty="0" smtClean="0"/>
+              <a:t>chiave</a:t>
+            </a:r>
+          </a:p>
+          <a:p>
+            <a:pPr marL="50800" lvl="0" indent="0" rtl="0">
+              <a:spcBef>
+                <a:spcPts val="600"/>
+              </a:spcBef>
+              <a:spcAft>
+                <a:spcPts val="0"/>
+              </a:spcAft>
+              <a:buSzPts val="2800"/>
+              <a:buNone/>
+            </a:pPr>
             <a:endParaRPr lang="it-CH" dirty="0" smtClean="0"/>
           </a:p>
           <a:p>

</xml_diff>